<commit_message>
Controller update, new UML diagramm
Controller tested, new hash alogrithm, new database structure
UML:
DatabaseController new
OverAll update
Workflow new
Realisierung... new
</commit_message>
<xml_diff>
--- a/documentation/presentations/PME2.pptx
+++ b/documentation/presentations/PME2.pptx
@@ -2753,7 +2753,7 @@
             </a:r>
             <a:fld id="{EC3F280D-E905-432E-9D9E-EAF8509BE84A}" type="datetime4">
               <a:rPr lang="de-DE" altLang="de-DE" smtClean="0"/>
-              <a:t>5. Oktober 2018</a:t>
+              <a:t>4. November 2018</a:t>
             </a:fld>
             <a:endParaRPr lang="de-DE" altLang="de-DE" dirty="0"/>
           </a:p>
@@ -3229,38 +3229,6 @@
       </p:sp>
       <p:sp>
         <p:nvSpPr>
-          <p:cNvPr id="9" name="Fußzeilenplatzhalter 2"/>
-          <p:cNvSpPr>
-            <a:spLocks noGrp="1"/>
-          </p:cNvSpPr>
-          <p:nvPr>
-            <p:ph type="ftr" sz="quarter" idx="10"/>
-          </p:nvPr>
-        </p:nvSpPr>
-        <p:spPr>
-          <a:xfrm>
-            <a:off x="990601" y="6629400"/>
-            <a:ext cx="5165576" cy="183976"/>
-          </a:xfrm>
-        </p:spPr>
-        <p:txBody>
-          <a:bodyPr/>
-          <a:lstStyle/>
-          <a:p>
-            <a:r>
-              <a:rPr lang="en-US" altLang="de-DE" dirty="0" err="1" smtClean="0"/>
-              <a:t>Hochschule</a:t>
-            </a:r>
-            <a:r>
-              <a:rPr lang="en-US" altLang="de-DE" dirty="0" smtClean="0"/>
-              <a:t> Mannheim University of Applied Sciences | Kevin Kastner</a:t>
-            </a:r>
-            <a:endParaRPr lang="de-DE" altLang="de-DE" dirty="0"/>
-          </a:p>
-        </p:txBody>
-      </p:sp>
-      <p:sp>
-        <p:nvSpPr>
           <p:cNvPr id="12" name="Rectangle 2"/>
           <p:cNvSpPr>
             <a:spLocks noGrp="1" noChangeArrowheads="1"/>
@@ -3609,6 +3577,266 @@
               <a:rPr lang="en-US" altLang="de-DE" kern="0" dirty="0"/>
               <a:t> Damian</a:t>
             </a:r>
+          </a:p>
+        </p:txBody>
+      </p:sp>
+      <p:sp>
+        <p:nvSpPr>
+          <p:cNvPr id="6" name="Fußzeilenplatzhalter 2"/>
+          <p:cNvSpPr txBox="1">
+            <a:spLocks/>
+          </p:cNvSpPr>
+          <p:nvPr/>
+        </p:nvSpPr>
+        <p:spPr bwMode="gray">
+          <a:xfrm>
+            <a:off x="971550" y="6540500"/>
+            <a:ext cx="8164016" cy="317500"/>
+          </a:xfrm>
+          <a:prstGeom prst="rect">
+            <a:avLst/>
+          </a:prstGeom>
+          <a:noFill/>
+          <a:ln>
+            <a:noFill/>
+          </a:ln>
+          <a:effectLst/>
+          <a:extLst>
+            <a:ext uri="{909E8E84-426E-40DD-AFC4-6F175D3DCCD1}">
+              <a14:hiddenFill xmlns:a14="http://schemas.microsoft.com/office/drawing/2010/main">
+                <a:solidFill>
+                  <a:schemeClr val="accent1"/>
+                </a:solidFill>
+              </a14:hiddenFill>
+            </a:ext>
+            <a:ext uri="{91240B29-F687-4F45-9708-019B960494DF}">
+              <a14:hiddenLine xmlns:a14="http://schemas.microsoft.com/office/drawing/2010/main" w="9525">
+                <a:solidFill>
+                  <a:schemeClr val="tx1"/>
+                </a:solidFill>
+                <a:miter lim="800000"/>
+                <a:headEnd/>
+                <a:tailEnd/>
+              </a14:hiddenLine>
+            </a:ext>
+            <a:ext uri="{AF507438-7753-43E0-B8FC-AC1667EBCBE1}">
+              <a14:hiddenEffects xmlns:a14="http://schemas.microsoft.com/office/drawing/2010/main">
+                <a:effectLst>
+                  <a:outerShdw dist="35921" dir="2700000" algn="ctr" rotWithShape="0">
+                    <a:schemeClr val="bg2"/>
+                  </a:outerShdw>
+                </a:effectLst>
+              </a14:hiddenEffects>
+            </a:ext>
+          </a:extLst>
+        </p:spPr>
+        <p:txBody>
+          <a:bodyPr vert="horz" wrap="none" lIns="0" tIns="0" rIns="0" bIns="0" numCol="1" anchor="b" anchorCtr="0" compatLnSpc="1">
+            <a:prstTxWarp prst="textNoShape">
+              <a:avLst/>
+            </a:prstTxWarp>
+          </a:bodyPr>
+          <a:lstStyle>
+            <a:defPPr>
+              <a:defRPr lang="en-US"/>
+            </a:defPPr>
+            <a:lvl1pPr algn="l" rtl="0" eaLnBrk="0" fontAlgn="base" hangingPunct="0">
+              <a:spcBef>
+                <a:spcPct val="0"/>
+              </a:spcBef>
+              <a:spcAft>
+                <a:spcPct val="0"/>
+              </a:spcAft>
+              <a:defRPr sz="1000" kern="1200">
+                <a:solidFill>
+                  <a:schemeClr val="bg1"/>
+                </a:solidFill>
+                <a:latin typeface="Arial" charset="0"/>
+                <a:ea typeface="+mn-ea"/>
+                <a:cs typeface="+mn-cs"/>
+              </a:defRPr>
+            </a:lvl1pPr>
+            <a:lvl2pPr marL="457200" algn="ctr" rtl="0" eaLnBrk="0" fontAlgn="base" hangingPunct="0">
+              <a:spcBef>
+                <a:spcPct val="0"/>
+              </a:spcBef>
+              <a:spcAft>
+                <a:spcPct val="0"/>
+              </a:spcAft>
+              <a:defRPr kern="1200">
+                <a:solidFill>
+                  <a:schemeClr val="tx1"/>
+                </a:solidFill>
+                <a:latin typeface="Arial" charset="0"/>
+                <a:ea typeface="+mn-ea"/>
+                <a:cs typeface="+mn-cs"/>
+              </a:defRPr>
+            </a:lvl2pPr>
+            <a:lvl3pPr marL="914400" algn="ctr" rtl="0" eaLnBrk="0" fontAlgn="base" hangingPunct="0">
+              <a:spcBef>
+                <a:spcPct val="0"/>
+              </a:spcBef>
+              <a:spcAft>
+                <a:spcPct val="0"/>
+              </a:spcAft>
+              <a:defRPr kern="1200">
+                <a:solidFill>
+                  <a:schemeClr val="tx1"/>
+                </a:solidFill>
+                <a:latin typeface="Arial" charset="0"/>
+                <a:ea typeface="+mn-ea"/>
+                <a:cs typeface="+mn-cs"/>
+              </a:defRPr>
+            </a:lvl3pPr>
+            <a:lvl4pPr marL="1371600" algn="ctr" rtl="0" eaLnBrk="0" fontAlgn="base" hangingPunct="0">
+              <a:spcBef>
+                <a:spcPct val="0"/>
+              </a:spcBef>
+              <a:spcAft>
+                <a:spcPct val="0"/>
+              </a:spcAft>
+              <a:defRPr kern="1200">
+                <a:solidFill>
+                  <a:schemeClr val="tx1"/>
+                </a:solidFill>
+                <a:latin typeface="Arial" charset="0"/>
+                <a:ea typeface="+mn-ea"/>
+                <a:cs typeface="+mn-cs"/>
+              </a:defRPr>
+            </a:lvl4pPr>
+            <a:lvl5pPr marL="1828800" algn="ctr" rtl="0" eaLnBrk="0" fontAlgn="base" hangingPunct="0">
+              <a:spcBef>
+                <a:spcPct val="0"/>
+              </a:spcBef>
+              <a:spcAft>
+                <a:spcPct val="0"/>
+              </a:spcAft>
+              <a:defRPr kern="1200">
+                <a:solidFill>
+                  <a:schemeClr val="tx1"/>
+                </a:solidFill>
+                <a:latin typeface="Arial" charset="0"/>
+                <a:ea typeface="+mn-ea"/>
+                <a:cs typeface="+mn-cs"/>
+              </a:defRPr>
+            </a:lvl5pPr>
+            <a:lvl6pPr marL="2286000" algn="l" defTabSz="914400" rtl="0" eaLnBrk="1" latinLnBrk="0" hangingPunct="1">
+              <a:defRPr kern="1200">
+                <a:solidFill>
+                  <a:schemeClr val="tx1"/>
+                </a:solidFill>
+                <a:latin typeface="Arial" charset="0"/>
+                <a:ea typeface="+mn-ea"/>
+                <a:cs typeface="+mn-cs"/>
+              </a:defRPr>
+            </a:lvl6pPr>
+            <a:lvl7pPr marL="2743200" algn="l" defTabSz="914400" rtl="0" eaLnBrk="1" latinLnBrk="0" hangingPunct="1">
+              <a:defRPr kern="1200">
+                <a:solidFill>
+                  <a:schemeClr val="tx1"/>
+                </a:solidFill>
+                <a:latin typeface="Arial" charset="0"/>
+                <a:ea typeface="+mn-ea"/>
+                <a:cs typeface="+mn-cs"/>
+              </a:defRPr>
+            </a:lvl7pPr>
+            <a:lvl8pPr marL="3200400" algn="l" defTabSz="914400" rtl="0" eaLnBrk="1" latinLnBrk="0" hangingPunct="1">
+              <a:defRPr kern="1200">
+                <a:solidFill>
+                  <a:schemeClr val="tx1"/>
+                </a:solidFill>
+                <a:latin typeface="Arial" charset="0"/>
+                <a:ea typeface="+mn-ea"/>
+                <a:cs typeface="+mn-cs"/>
+              </a:defRPr>
+            </a:lvl8pPr>
+            <a:lvl9pPr marL="3657600" algn="l" defTabSz="914400" rtl="0" eaLnBrk="1" latinLnBrk="0" hangingPunct="1">
+              <a:defRPr kern="1200">
+                <a:solidFill>
+                  <a:schemeClr val="tx1"/>
+                </a:solidFill>
+                <a:latin typeface="Arial" charset="0"/>
+                <a:ea typeface="+mn-ea"/>
+                <a:cs typeface="+mn-cs"/>
+              </a:defRPr>
+            </a:lvl9pPr>
+          </a:lstStyle>
+          <a:p>
+            <a:r>
+              <a:rPr lang="en-US" altLang="de-DE" dirty="0" err="1" smtClean="0"/>
+              <a:t>Hochschule</a:t>
+            </a:r>
+            <a:r>
+              <a:rPr lang="en-US" altLang="de-DE" dirty="0" smtClean="0"/>
+              <a:t> Mannheim University of Applied Sciences | </a:t>
+            </a:r>
+            <a:r>
+              <a:rPr lang="de-DE" altLang="de-DE" dirty="0" err="1" smtClean="0"/>
+              <a:t>Bechberger</a:t>
+            </a:r>
+            <a:r>
+              <a:rPr lang="de-DE" altLang="de-DE" dirty="0" smtClean="0"/>
+              <a:t> Martin, Benz Marius, Kastner Kevin, </a:t>
+            </a:r>
+            <a:r>
+              <a:rPr lang="de-DE" altLang="de-DE" dirty="0" err="1" smtClean="0"/>
+              <a:t>Koß</a:t>
+            </a:r>
+            <a:r>
+              <a:rPr lang="en-US" altLang="de-DE" dirty="0" err="1" smtClean="0"/>
+              <a:t>mann</a:t>
+            </a:r>
+            <a:r>
+              <a:rPr lang="en-US" altLang="de-DE" dirty="0" smtClean="0"/>
+              <a:t> </a:t>
+            </a:r>
+            <a:r>
+              <a:rPr lang="en-US" altLang="de-DE" dirty="0" err="1" smtClean="0"/>
+              <a:t>Verena</a:t>
+            </a:r>
+            <a:r>
+              <a:rPr lang="en-US" altLang="de-DE" dirty="0" smtClean="0"/>
+              <a:t>,</a:t>
+            </a:r>
+            <a:r>
+              <a:rPr lang="de-DE" altLang="de-DE" dirty="0" smtClean="0"/>
+              <a:t> </a:t>
+            </a:r>
+          </a:p>
+          <a:p>
+            <a:r>
+              <a:rPr lang="de-DE" altLang="de-DE" dirty="0" smtClean="0"/>
+              <a:t>			           </a:t>
+            </a:r>
+            <a:r>
+              <a:rPr lang="de-DE" altLang="de-DE" dirty="0" err="1" smtClean="0"/>
+              <a:t>Lehnart</a:t>
+            </a:r>
+            <a:r>
+              <a:rPr lang="de-DE" altLang="de-DE" dirty="0" smtClean="0"/>
+              <a:t> Vanessa,</a:t>
+            </a:r>
+            <a:r>
+              <a:rPr lang="en-US" altLang="de-DE" dirty="0" smtClean="0"/>
+              <a:t> Voigt </a:t>
+            </a:r>
+            <a:r>
+              <a:rPr lang="en-US" altLang="de-DE" dirty="0" err="1" smtClean="0"/>
+              <a:t>Jakob</a:t>
+            </a:r>
+            <a:r>
+              <a:rPr lang="en-US" altLang="de-DE" dirty="0" smtClean="0"/>
+              <a:t>, </a:t>
+            </a:r>
+            <a:r>
+              <a:rPr lang="en-US" altLang="de-DE" dirty="0" err="1" smtClean="0"/>
+              <a:t>Wrobel</a:t>
+            </a:r>
+            <a:r>
+              <a:rPr lang="en-US" altLang="de-DE" dirty="0" smtClean="0"/>
+              <a:t> Damian</a:t>
+            </a:r>
+            <a:endParaRPr lang="de-DE" altLang="de-DE" dirty="0"/>
           </a:p>
         </p:txBody>
       </p:sp>
@@ -3911,38 +4139,6 @@
       </p:sp>
       <p:sp>
         <p:nvSpPr>
-          <p:cNvPr id="9" name="Fußzeilenplatzhalter 2"/>
-          <p:cNvSpPr>
-            <a:spLocks noGrp="1"/>
-          </p:cNvSpPr>
-          <p:nvPr>
-            <p:ph type="ftr" sz="quarter" idx="10"/>
-          </p:nvPr>
-        </p:nvSpPr>
-        <p:spPr>
-          <a:xfrm>
-            <a:off x="990601" y="6629400"/>
-            <a:ext cx="5165576" cy="183976"/>
-          </a:xfrm>
-        </p:spPr>
-        <p:txBody>
-          <a:bodyPr/>
-          <a:lstStyle/>
-          <a:p>
-            <a:r>
-              <a:rPr lang="en-US" altLang="de-DE" dirty="0" err="1" smtClean="0"/>
-              <a:t>Hochschule</a:t>
-            </a:r>
-            <a:r>
-              <a:rPr lang="en-US" altLang="de-DE" dirty="0" smtClean="0"/>
-              <a:t> Mannheim University of Applied Sciences | Kevin Kastner</a:t>
-            </a:r>
-            <a:endParaRPr lang="de-DE" altLang="de-DE" dirty="0"/>
-          </a:p>
-        </p:txBody>
-      </p:sp>
-      <p:sp>
-        <p:nvSpPr>
           <p:cNvPr id="12" name="Rectangle 2"/>
           <p:cNvSpPr>
             <a:spLocks noGrp="1" noChangeArrowheads="1"/>
@@ -4215,6 +4411,266 @@
               <a:t>Mechanismus</a:t>
             </a:r>
             <a:endParaRPr lang="de-DE" altLang="de-DE" kern="0" dirty="0" smtClean="0"/>
+          </a:p>
+        </p:txBody>
+      </p:sp>
+      <p:sp>
+        <p:nvSpPr>
+          <p:cNvPr id="6" name="Fußzeilenplatzhalter 2"/>
+          <p:cNvSpPr txBox="1">
+            <a:spLocks/>
+          </p:cNvSpPr>
+          <p:nvPr/>
+        </p:nvSpPr>
+        <p:spPr bwMode="gray">
+          <a:xfrm>
+            <a:off x="971550" y="6540500"/>
+            <a:ext cx="8164016" cy="317500"/>
+          </a:xfrm>
+          <a:prstGeom prst="rect">
+            <a:avLst/>
+          </a:prstGeom>
+          <a:noFill/>
+          <a:ln>
+            <a:noFill/>
+          </a:ln>
+          <a:effectLst/>
+          <a:extLst>
+            <a:ext uri="{909E8E84-426E-40DD-AFC4-6F175D3DCCD1}">
+              <a14:hiddenFill xmlns:a14="http://schemas.microsoft.com/office/drawing/2010/main">
+                <a:solidFill>
+                  <a:schemeClr val="accent1"/>
+                </a:solidFill>
+              </a14:hiddenFill>
+            </a:ext>
+            <a:ext uri="{91240B29-F687-4F45-9708-019B960494DF}">
+              <a14:hiddenLine xmlns:a14="http://schemas.microsoft.com/office/drawing/2010/main" w="9525">
+                <a:solidFill>
+                  <a:schemeClr val="tx1"/>
+                </a:solidFill>
+                <a:miter lim="800000"/>
+                <a:headEnd/>
+                <a:tailEnd/>
+              </a14:hiddenLine>
+            </a:ext>
+            <a:ext uri="{AF507438-7753-43E0-B8FC-AC1667EBCBE1}">
+              <a14:hiddenEffects xmlns:a14="http://schemas.microsoft.com/office/drawing/2010/main">
+                <a:effectLst>
+                  <a:outerShdw dist="35921" dir="2700000" algn="ctr" rotWithShape="0">
+                    <a:schemeClr val="bg2"/>
+                  </a:outerShdw>
+                </a:effectLst>
+              </a14:hiddenEffects>
+            </a:ext>
+          </a:extLst>
+        </p:spPr>
+        <p:txBody>
+          <a:bodyPr vert="horz" wrap="none" lIns="0" tIns="0" rIns="0" bIns="0" numCol="1" anchor="b" anchorCtr="0" compatLnSpc="1">
+            <a:prstTxWarp prst="textNoShape">
+              <a:avLst/>
+            </a:prstTxWarp>
+          </a:bodyPr>
+          <a:lstStyle>
+            <a:defPPr>
+              <a:defRPr lang="en-US"/>
+            </a:defPPr>
+            <a:lvl1pPr algn="l" rtl="0" eaLnBrk="0" fontAlgn="base" hangingPunct="0">
+              <a:spcBef>
+                <a:spcPct val="0"/>
+              </a:spcBef>
+              <a:spcAft>
+                <a:spcPct val="0"/>
+              </a:spcAft>
+              <a:defRPr sz="1000" kern="1200">
+                <a:solidFill>
+                  <a:schemeClr val="bg1"/>
+                </a:solidFill>
+                <a:latin typeface="Arial" charset="0"/>
+                <a:ea typeface="+mn-ea"/>
+                <a:cs typeface="+mn-cs"/>
+              </a:defRPr>
+            </a:lvl1pPr>
+            <a:lvl2pPr marL="457200" algn="ctr" rtl="0" eaLnBrk="0" fontAlgn="base" hangingPunct="0">
+              <a:spcBef>
+                <a:spcPct val="0"/>
+              </a:spcBef>
+              <a:spcAft>
+                <a:spcPct val="0"/>
+              </a:spcAft>
+              <a:defRPr kern="1200">
+                <a:solidFill>
+                  <a:schemeClr val="tx1"/>
+                </a:solidFill>
+                <a:latin typeface="Arial" charset="0"/>
+                <a:ea typeface="+mn-ea"/>
+                <a:cs typeface="+mn-cs"/>
+              </a:defRPr>
+            </a:lvl2pPr>
+            <a:lvl3pPr marL="914400" algn="ctr" rtl="0" eaLnBrk="0" fontAlgn="base" hangingPunct="0">
+              <a:spcBef>
+                <a:spcPct val="0"/>
+              </a:spcBef>
+              <a:spcAft>
+                <a:spcPct val="0"/>
+              </a:spcAft>
+              <a:defRPr kern="1200">
+                <a:solidFill>
+                  <a:schemeClr val="tx1"/>
+                </a:solidFill>
+                <a:latin typeface="Arial" charset="0"/>
+                <a:ea typeface="+mn-ea"/>
+                <a:cs typeface="+mn-cs"/>
+              </a:defRPr>
+            </a:lvl3pPr>
+            <a:lvl4pPr marL="1371600" algn="ctr" rtl="0" eaLnBrk="0" fontAlgn="base" hangingPunct="0">
+              <a:spcBef>
+                <a:spcPct val="0"/>
+              </a:spcBef>
+              <a:spcAft>
+                <a:spcPct val="0"/>
+              </a:spcAft>
+              <a:defRPr kern="1200">
+                <a:solidFill>
+                  <a:schemeClr val="tx1"/>
+                </a:solidFill>
+                <a:latin typeface="Arial" charset="0"/>
+                <a:ea typeface="+mn-ea"/>
+                <a:cs typeface="+mn-cs"/>
+              </a:defRPr>
+            </a:lvl4pPr>
+            <a:lvl5pPr marL="1828800" algn="ctr" rtl="0" eaLnBrk="0" fontAlgn="base" hangingPunct="0">
+              <a:spcBef>
+                <a:spcPct val="0"/>
+              </a:spcBef>
+              <a:spcAft>
+                <a:spcPct val="0"/>
+              </a:spcAft>
+              <a:defRPr kern="1200">
+                <a:solidFill>
+                  <a:schemeClr val="tx1"/>
+                </a:solidFill>
+                <a:latin typeface="Arial" charset="0"/>
+                <a:ea typeface="+mn-ea"/>
+                <a:cs typeface="+mn-cs"/>
+              </a:defRPr>
+            </a:lvl5pPr>
+            <a:lvl6pPr marL="2286000" algn="l" defTabSz="914400" rtl="0" eaLnBrk="1" latinLnBrk="0" hangingPunct="1">
+              <a:defRPr kern="1200">
+                <a:solidFill>
+                  <a:schemeClr val="tx1"/>
+                </a:solidFill>
+                <a:latin typeface="Arial" charset="0"/>
+                <a:ea typeface="+mn-ea"/>
+                <a:cs typeface="+mn-cs"/>
+              </a:defRPr>
+            </a:lvl6pPr>
+            <a:lvl7pPr marL="2743200" algn="l" defTabSz="914400" rtl="0" eaLnBrk="1" latinLnBrk="0" hangingPunct="1">
+              <a:defRPr kern="1200">
+                <a:solidFill>
+                  <a:schemeClr val="tx1"/>
+                </a:solidFill>
+                <a:latin typeface="Arial" charset="0"/>
+                <a:ea typeface="+mn-ea"/>
+                <a:cs typeface="+mn-cs"/>
+              </a:defRPr>
+            </a:lvl7pPr>
+            <a:lvl8pPr marL="3200400" algn="l" defTabSz="914400" rtl="0" eaLnBrk="1" latinLnBrk="0" hangingPunct="1">
+              <a:defRPr kern="1200">
+                <a:solidFill>
+                  <a:schemeClr val="tx1"/>
+                </a:solidFill>
+                <a:latin typeface="Arial" charset="0"/>
+                <a:ea typeface="+mn-ea"/>
+                <a:cs typeface="+mn-cs"/>
+              </a:defRPr>
+            </a:lvl8pPr>
+            <a:lvl9pPr marL="3657600" algn="l" defTabSz="914400" rtl="0" eaLnBrk="1" latinLnBrk="0" hangingPunct="1">
+              <a:defRPr kern="1200">
+                <a:solidFill>
+                  <a:schemeClr val="tx1"/>
+                </a:solidFill>
+                <a:latin typeface="Arial" charset="0"/>
+                <a:ea typeface="+mn-ea"/>
+                <a:cs typeface="+mn-cs"/>
+              </a:defRPr>
+            </a:lvl9pPr>
+          </a:lstStyle>
+          <a:p>
+            <a:r>
+              <a:rPr lang="en-US" altLang="de-DE" dirty="0" err="1" smtClean="0"/>
+              <a:t>Hochschule</a:t>
+            </a:r>
+            <a:r>
+              <a:rPr lang="en-US" altLang="de-DE" dirty="0" smtClean="0"/>
+              <a:t> Mannheim University of Applied Sciences | </a:t>
+            </a:r>
+            <a:r>
+              <a:rPr lang="de-DE" altLang="de-DE" dirty="0" err="1" smtClean="0"/>
+              <a:t>Bechberger</a:t>
+            </a:r>
+            <a:r>
+              <a:rPr lang="de-DE" altLang="de-DE" dirty="0" smtClean="0"/>
+              <a:t> Martin, Benz Marius, Kastner Kevin, </a:t>
+            </a:r>
+            <a:r>
+              <a:rPr lang="de-DE" altLang="de-DE" dirty="0" err="1" smtClean="0"/>
+              <a:t>Koß</a:t>
+            </a:r>
+            <a:r>
+              <a:rPr lang="en-US" altLang="de-DE" dirty="0" err="1" smtClean="0"/>
+              <a:t>mann</a:t>
+            </a:r>
+            <a:r>
+              <a:rPr lang="en-US" altLang="de-DE" dirty="0" smtClean="0"/>
+              <a:t> </a:t>
+            </a:r>
+            <a:r>
+              <a:rPr lang="en-US" altLang="de-DE" dirty="0" err="1" smtClean="0"/>
+              <a:t>Verena</a:t>
+            </a:r>
+            <a:r>
+              <a:rPr lang="en-US" altLang="de-DE" dirty="0" smtClean="0"/>
+              <a:t>,</a:t>
+            </a:r>
+            <a:r>
+              <a:rPr lang="de-DE" altLang="de-DE" dirty="0" smtClean="0"/>
+              <a:t> </a:t>
+            </a:r>
+          </a:p>
+          <a:p>
+            <a:r>
+              <a:rPr lang="de-DE" altLang="de-DE" dirty="0" smtClean="0"/>
+              <a:t>			           </a:t>
+            </a:r>
+            <a:r>
+              <a:rPr lang="de-DE" altLang="de-DE" dirty="0" err="1" smtClean="0"/>
+              <a:t>Lehnart</a:t>
+            </a:r>
+            <a:r>
+              <a:rPr lang="de-DE" altLang="de-DE" dirty="0" smtClean="0"/>
+              <a:t> Vanessa,</a:t>
+            </a:r>
+            <a:r>
+              <a:rPr lang="en-US" altLang="de-DE" dirty="0" smtClean="0"/>
+              <a:t> Voigt </a:t>
+            </a:r>
+            <a:r>
+              <a:rPr lang="en-US" altLang="de-DE" dirty="0" err="1" smtClean="0"/>
+              <a:t>Jakob</a:t>
+            </a:r>
+            <a:r>
+              <a:rPr lang="en-US" altLang="de-DE" dirty="0" smtClean="0"/>
+              <a:t>, </a:t>
+            </a:r>
+            <a:r>
+              <a:rPr lang="en-US" altLang="de-DE" dirty="0" err="1" smtClean="0"/>
+              <a:t>Wrobel</a:t>
+            </a:r>
+            <a:r>
+              <a:rPr lang="en-US" altLang="de-DE" dirty="0" smtClean="0"/>
+              <a:t> Damian</a:t>
+            </a:r>
+            <a:endParaRPr lang="de-DE" altLang="de-DE" dirty="0"/>
           </a:p>
         </p:txBody>
       </p:sp>
@@ -4395,33 +4851,6 @@
       </p:grpSpPr>
       <p:sp>
         <p:nvSpPr>
-          <p:cNvPr id="3" name="Fußzeilenplatzhalter 2"/>
-          <p:cNvSpPr>
-            <a:spLocks noGrp="1"/>
-          </p:cNvSpPr>
-          <p:nvPr>
-            <p:ph type="ftr" sz="quarter" idx="10"/>
-          </p:nvPr>
-        </p:nvSpPr>
-        <p:spPr/>
-        <p:txBody>
-          <a:bodyPr/>
-          <a:lstStyle/>
-          <a:p>
-            <a:r>
-              <a:rPr lang="en-US" altLang="de-DE" dirty="0" err="1" smtClean="0"/>
-              <a:t>Hochschule</a:t>
-            </a:r>
-            <a:r>
-              <a:rPr lang="en-US" altLang="de-DE" dirty="0" smtClean="0"/>
-              <a:t> Mannheim University of Applied Sciences | Kevin Kastner</a:t>
-            </a:r>
-            <a:endParaRPr lang="de-DE" altLang="de-DE" dirty="0"/>
-          </a:p>
-        </p:txBody>
-      </p:sp>
-      <p:sp>
-        <p:nvSpPr>
           <p:cNvPr id="4" name="Foliennummernplatzhalter 3"/>
           <p:cNvSpPr>
             <a:spLocks noGrp="1"/>
@@ -4932,13 +5361,273 @@
                   <a:schemeClr val="tx1"/>
                 </a:solidFill>
               </a:rPr>
-              <a:t>5. Oktober 2018</a:t>
+              <a:t>4. November 2018</a:t>
             </a:fld>
             <a:endParaRPr lang="de-DE" altLang="de-DE" dirty="0">
               <a:solidFill>
                 <a:schemeClr val="tx1"/>
               </a:solidFill>
             </a:endParaRPr>
+          </a:p>
+        </p:txBody>
+      </p:sp>
+      <p:sp>
+        <p:nvSpPr>
+          <p:cNvPr id="7" name="Fußzeilenplatzhalter 2"/>
+          <p:cNvSpPr txBox="1">
+            <a:spLocks/>
+          </p:cNvSpPr>
+          <p:nvPr/>
+        </p:nvSpPr>
+        <p:spPr bwMode="gray">
+          <a:xfrm>
+            <a:off x="971550" y="6540500"/>
+            <a:ext cx="8164016" cy="317500"/>
+          </a:xfrm>
+          <a:prstGeom prst="rect">
+            <a:avLst/>
+          </a:prstGeom>
+          <a:noFill/>
+          <a:ln>
+            <a:noFill/>
+          </a:ln>
+          <a:effectLst/>
+          <a:extLst>
+            <a:ext uri="{909E8E84-426E-40DD-AFC4-6F175D3DCCD1}">
+              <a14:hiddenFill xmlns:a14="http://schemas.microsoft.com/office/drawing/2010/main">
+                <a:solidFill>
+                  <a:schemeClr val="accent1"/>
+                </a:solidFill>
+              </a14:hiddenFill>
+            </a:ext>
+            <a:ext uri="{91240B29-F687-4F45-9708-019B960494DF}">
+              <a14:hiddenLine xmlns:a14="http://schemas.microsoft.com/office/drawing/2010/main" w="9525">
+                <a:solidFill>
+                  <a:schemeClr val="tx1"/>
+                </a:solidFill>
+                <a:miter lim="800000"/>
+                <a:headEnd/>
+                <a:tailEnd/>
+              </a14:hiddenLine>
+            </a:ext>
+            <a:ext uri="{AF507438-7753-43E0-B8FC-AC1667EBCBE1}">
+              <a14:hiddenEffects xmlns:a14="http://schemas.microsoft.com/office/drawing/2010/main">
+                <a:effectLst>
+                  <a:outerShdw dist="35921" dir="2700000" algn="ctr" rotWithShape="0">
+                    <a:schemeClr val="bg2"/>
+                  </a:outerShdw>
+                </a:effectLst>
+              </a14:hiddenEffects>
+            </a:ext>
+          </a:extLst>
+        </p:spPr>
+        <p:txBody>
+          <a:bodyPr vert="horz" wrap="none" lIns="0" tIns="0" rIns="0" bIns="0" numCol="1" anchor="b" anchorCtr="0" compatLnSpc="1">
+            <a:prstTxWarp prst="textNoShape">
+              <a:avLst/>
+            </a:prstTxWarp>
+          </a:bodyPr>
+          <a:lstStyle>
+            <a:defPPr>
+              <a:defRPr lang="en-US"/>
+            </a:defPPr>
+            <a:lvl1pPr algn="l" rtl="0" eaLnBrk="0" fontAlgn="base" hangingPunct="0">
+              <a:spcBef>
+                <a:spcPct val="0"/>
+              </a:spcBef>
+              <a:spcAft>
+                <a:spcPct val="0"/>
+              </a:spcAft>
+              <a:defRPr sz="1000" kern="1200">
+                <a:solidFill>
+                  <a:schemeClr val="bg1"/>
+                </a:solidFill>
+                <a:latin typeface="Arial" charset="0"/>
+                <a:ea typeface="+mn-ea"/>
+                <a:cs typeface="+mn-cs"/>
+              </a:defRPr>
+            </a:lvl1pPr>
+            <a:lvl2pPr marL="457200" algn="ctr" rtl="0" eaLnBrk="0" fontAlgn="base" hangingPunct="0">
+              <a:spcBef>
+                <a:spcPct val="0"/>
+              </a:spcBef>
+              <a:spcAft>
+                <a:spcPct val="0"/>
+              </a:spcAft>
+              <a:defRPr kern="1200">
+                <a:solidFill>
+                  <a:schemeClr val="tx1"/>
+                </a:solidFill>
+                <a:latin typeface="Arial" charset="0"/>
+                <a:ea typeface="+mn-ea"/>
+                <a:cs typeface="+mn-cs"/>
+              </a:defRPr>
+            </a:lvl2pPr>
+            <a:lvl3pPr marL="914400" algn="ctr" rtl="0" eaLnBrk="0" fontAlgn="base" hangingPunct="0">
+              <a:spcBef>
+                <a:spcPct val="0"/>
+              </a:spcBef>
+              <a:spcAft>
+                <a:spcPct val="0"/>
+              </a:spcAft>
+              <a:defRPr kern="1200">
+                <a:solidFill>
+                  <a:schemeClr val="tx1"/>
+                </a:solidFill>
+                <a:latin typeface="Arial" charset="0"/>
+                <a:ea typeface="+mn-ea"/>
+                <a:cs typeface="+mn-cs"/>
+              </a:defRPr>
+            </a:lvl3pPr>
+            <a:lvl4pPr marL="1371600" algn="ctr" rtl="0" eaLnBrk="0" fontAlgn="base" hangingPunct="0">
+              <a:spcBef>
+                <a:spcPct val="0"/>
+              </a:spcBef>
+              <a:spcAft>
+                <a:spcPct val="0"/>
+              </a:spcAft>
+              <a:defRPr kern="1200">
+                <a:solidFill>
+                  <a:schemeClr val="tx1"/>
+                </a:solidFill>
+                <a:latin typeface="Arial" charset="0"/>
+                <a:ea typeface="+mn-ea"/>
+                <a:cs typeface="+mn-cs"/>
+              </a:defRPr>
+            </a:lvl4pPr>
+            <a:lvl5pPr marL="1828800" algn="ctr" rtl="0" eaLnBrk="0" fontAlgn="base" hangingPunct="0">
+              <a:spcBef>
+                <a:spcPct val="0"/>
+              </a:spcBef>
+              <a:spcAft>
+                <a:spcPct val="0"/>
+              </a:spcAft>
+              <a:defRPr kern="1200">
+                <a:solidFill>
+                  <a:schemeClr val="tx1"/>
+                </a:solidFill>
+                <a:latin typeface="Arial" charset="0"/>
+                <a:ea typeface="+mn-ea"/>
+                <a:cs typeface="+mn-cs"/>
+              </a:defRPr>
+            </a:lvl5pPr>
+            <a:lvl6pPr marL="2286000" algn="l" defTabSz="914400" rtl="0" eaLnBrk="1" latinLnBrk="0" hangingPunct="1">
+              <a:defRPr kern="1200">
+                <a:solidFill>
+                  <a:schemeClr val="tx1"/>
+                </a:solidFill>
+                <a:latin typeface="Arial" charset="0"/>
+                <a:ea typeface="+mn-ea"/>
+                <a:cs typeface="+mn-cs"/>
+              </a:defRPr>
+            </a:lvl6pPr>
+            <a:lvl7pPr marL="2743200" algn="l" defTabSz="914400" rtl="0" eaLnBrk="1" latinLnBrk="0" hangingPunct="1">
+              <a:defRPr kern="1200">
+                <a:solidFill>
+                  <a:schemeClr val="tx1"/>
+                </a:solidFill>
+                <a:latin typeface="Arial" charset="0"/>
+                <a:ea typeface="+mn-ea"/>
+                <a:cs typeface="+mn-cs"/>
+              </a:defRPr>
+            </a:lvl7pPr>
+            <a:lvl8pPr marL="3200400" algn="l" defTabSz="914400" rtl="0" eaLnBrk="1" latinLnBrk="0" hangingPunct="1">
+              <a:defRPr kern="1200">
+                <a:solidFill>
+                  <a:schemeClr val="tx1"/>
+                </a:solidFill>
+                <a:latin typeface="Arial" charset="0"/>
+                <a:ea typeface="+mn-ea"/>
+                <a:cs typeface="+mn-cs"/>
+              </a:defRPr>
+            </a:lvl8pPr>
+            <a:lvl9pPr marL="3657600" algn="l" defTabSz="914400" rtl="0" eaLnBrk="1" latinLnBrk="0" hangingPunct="1">
+              <a:defRPr kern="1200">
+                <a:solidFill>
+                  <a:schemeClr val="tx1"/>
+                </a:solidFill>
+                <a:latin typeface="Arial" charset="0"/>
+                <a:ea typeface="+mn-ea"/>
+                <a:cs typeface="+mn-cs"/>
+              </a:defRPr>
+            </a:lvl9pPr>
+          </a:lstStyle>
+          <a:p>
+            <a:r>
+              <a:rPr lang="en-US" altLang="de-DE" dirty="0" err="1" smtClean="0"/>
+              <a:t>Hochschule</a:t>
+            </a:r>
+            <a:r>
+              <a:rPr lang="en-US" altLang="de-DE" dirty="0" smtClean="0"/>
+              <a:t> Mannheim University of Applied Sciences | </a:t>
+            </a:r>
+            <a:r>
+              <a:rPr lang="de-DE" altLang="de-DE" dirty="0" err="1" smtClean="0"/>
+              <a:t>Bechberger</a:t>
+            </a:r>
+            <a:r>
+              <a:rPr lang="de-DE" altLang="de-DE" dirty="0" smtClean="0"/>
+              <a:t> Martin, Benz Marius, Kastner Kevin, </a:t>
+            </a:r>
+            <a:r>
+              <a:rPr lang="de-DE" altLang="de-DE" dirty="0" err="1" smtClean="0"/>
+              <a:t>Koß</a:t>
+            </a:r>
+            <a:r>
+              <a:rPr lang="en-US" altLang="de-DE" dirty="0" err="1" smtClean="0"/>
+              <a:t>mann</a:t>
+            </a:r>
+            <a:r>
+              <a:rPr lang="en-US" altLang="de-DE" dirty="0" smtClean="0"/>
+              <a:t> </a:t>
+            </a:r>
+            <a:r>
+              <a:rPr lang="en-US" altLang="de-DE" dirty="0" err="1" smtClean="0"/>
+              <a:t>Verena</a:t>
+            </a:r>
+            <a:r>
+              <a:rPr lang="en-US" altLang="de-DE" dirty="0" smtClean="0"/>
+              <a:t>,</a:t>
+            </a:r>
+            <a:r>
+              <a:rPr lang="de-DE" altLang="de-DE" dirty="0" smtClean="0"/>
+              <a:t> </a:t>
+            </a:r>
+          </a:p>
+          <a:p>
+            <a:r>
+              <a:rPr lang="de-DE" altLang="de-DE" dirty="0" smtClean="0"/>
+              <a:t>			           </a:t>
+            </a:r>
+            <a:r>
+              <a:rPr lang="de-DE" altLang="de-DE" dirty="0" err="1" smtClean="0"/>
+              <a:t>Lehnart</a:t>
+            </a:r>
+            <a:r>
+              <a:rPr lang="de-DE" altLang="de-DE" dirty="0" smtClean="0"/>
+              <a:t> Vanessa,</a:t>
+            </a:r>
+            <a:r>
+              <a:rPr lang="en-US" altLang="de-DE" dirty="0" smtClean="0"/>
+              <a:t> Voigt </a:t>
+            </a:r>
+            <a:r>
+              <a:rPr lang="en-US" altLang="de-DE" dirty="0" err="1" smtClean="0"/>
+              <a:t>Jakob</a:t>
+            </a:r>
+            <a:r>
+              <a:rPr lang="en-US" altLang="de-DE" dirty="0" smtClean="0"/>
+              <a:t>, </a:t>
+            </a:r>
+            <a:r>
+              <a:rPr lang="en-US" altLang="de-DE" dirty="0" err="1" smtClean="0"/>
+              <a:t>Wrobel</a:t>
+            </a:r>
+            <a:r>
+              <a:rPr lang="en-US" altLang="de-DE" dirty="0" smtClean="0"/>
+              <a:t> Damian</a:t>
+            </a:r>
+            <a:endParaRPr lang="de-DE" altLang="de-DE" dirty="0"/>
           </a:p>
         </p:txBody>
       </p:sp>

</xml_diff>